<commit_message>
Change PPT. Add figures.
</commit_message>
<xml_diff>
--- a/idea poster.pptx
+++ b/idea poster.pptx
@@ -5,10 +5,10 @@
     <p:sldMasterId id="2147483648" r:id="rId1"/>
   </p:sldMasterIdLst>
   <p:notesMasterIdLst>
-    <p:notesMasterId r:id="rId4"/>
+    <p:notesMasterId r:id="rId3"/>
   </p:notesMasterIdLst>
   <p:sldIdLst>
-    <p:sldId id="257" r:id="rId3"/>
+    <p:sldId id="258" r:id="rId2"/>
   </p:sldIdLst>
   <p:sldSz cx="12192000" cy="6858000"/>
   <p:notesSz cx="6858000" cy="9144000"/>
@@ -107,6 +107,11 @@
       </a:defRPr>
     </a:lvl9pPr>
   </p:defaultTextStyle>
+  <p:extLst>
+    <p:ext uri="{EFAFB233-063F-42B5-8137-9DF3F51BA10A}">
+      <p15:sldGuideLst xmlns:p15="http://schemas.microsoft.com/office/powerpoint/2012/main"/>
+    </p:ext>
+  </p:extLst>
 </p:presentation>
 </file>
 
@@ -192,6 +197,7 @@
           <a:p>
             <a:fld id="{99914300-88F6-7848-8AE0-FCF70DE44CB4}" type="datetimeFigureOut">
               <a:rPr kumimoji="1" lang="zh-CN" altLang="en-US" smtClean="0"/>
+              <a:t>2025/6/13</a:t>
             </a:fld>
             <a:endParaRPr kumimoji="1" lang="zh-CN" altLang="en-US"/>
           </a:p>
@@ -258,7 +264,6 @@
               <a:rPr kumimoji="1" lang="zh-CN" altLang="en-US"/>
               <a:t>单击此处编辑母版文本样式</a:t>
             </a:r>
-            <a:endParaRPr kumimoji="1" lang="zh-CN" altLang="en-US"/>
           </a:p>
           <a:p>
             <a:pPr lvl="1"/>
@@ -266,7 +271,6 @@
               <a:rPr kumimoji="1" lang="zh-CN" altLang="en-US"/>
               <a:t>二级</a:t>
             </a:r>
-            <a:endParaRPr kumimoji="1" lang="zh-CN" altLang="en-US"/>
           </a:p>
           <a:p>
             <a:pPr lvl="2"/>
@@ -274,7 +278,6 @@
               <a:rPr kumimoji="1" lang="zh-CN" altLang="en-US"/>
               <a:t>三级</a:t>
             </a:r>
-            <a:endParaRPr kumimoji="1" lang="zh-CN" altLang="en-US"/>
           </a:p>
           <a:p>
             <a:pPr lvl="3"/>
@@ -282,7 +285,6 @@
               <a:rPr kumimoji="1" lang="zh-CN" altLang="en-US"/>
               <a:t>四级</a:t>
             </a:r>
-            <a:endParaRPr kumimoji="1" lang="zh-CN" altLang="en-US"/>
           </a:p>
           <a:p>
             <a:pPr lvl="4"/>
@@ -290,7 +292,6 @@
               <a:rPr kumimoji="1" lang="zh-CN" altLang="en-US"/>
               <a:t>五级</a:t>
             </a:r>
-            <a:endParaRPr kumimoji="1" lang="zh-CN" altLang="en-US"/>
           </a:p>
         </p:txBody>
       </p:sp>
@@ -354,6 +355,7 @@
           <a:p>
             <a:fld id="{568B4A32-60D1-C44E-B0AB-05189C8B39E0}" type="slidenum">
               <a:rPr kumimoji="1" lang="zh-CN" altLang="en-US" smtClean="0"/>
+              <a:t>‹#›</a:t>
             </a:fld>
             <a:endParaRPr kumimoji="1" lang="zh-CN" altLang="en-US"/>
           </a:p>
@@ -522,6 +524,7 @@
           <a:p>
             <a:fld id="{568B4A32-60D1-C44E-B0AB-05189C8B39E0}" type="slidenum">
               <a:rPr kumimoji="1" lang="zh-CN" altLang="en-US" smtClean="0"/>
+              <a:t>1</a:t>
             </a:fld>
             <a:endParaRPr kumimoji="1" lang="zh-CN" altLang="en-US"/>
           </a:p>
@@ -580,7 +583,6 @@
               <a:rPr kumimoji="1" lang="zh-CN" altLang="en-US"/>
               <a:t>单击此处编辑母版标题样式</a:t>
             </a:r>
-            <a:endParaRPr kumimoji="1" lang="zh-CN" altLang="en-US"/>
           </a:p>
         </p:txBody>
       </p:sp>
@@ -645,7 +647,6 @@
               <a:rPr kumimoji="1" lang="zh-CN" altLang="en-US"/>
               <a:t>单击此处编辑母版副标题样式</a:t>
             </a:r>
-            <a:endParaRPr kumimoji="1" lang="zh-CN" altLang="en-US"/>
           </a:p>
         </p:txBody>
       </p:sp>
@@ -666,6 +667,7 @@
           <a:p>
             <a:fld id="{B8C17918-3A8B-164F-B62C-07D5B113208C}" type="datetimeFigureOut">
               <a:rPr kumimoji="1" lang="zh-CN" altLang="en-US" smtClean="0"/>
+              <a:t>2025/6/13</a:t>
             </a:fld>
             <a:endParaRPr kumimoji="1" lang="zh-CN" altLang="en-US"/>
           </a:p>
@@ -707,6 +709,7 @@
           <a:p>
             <a:fld id="{0E00DDE1-2C70-D44F-8677-F4A7388D2818}" type="slidenum">
               <a:rPr kumimoji="1" lang="zh-CN" altLang="en-US" smtClean="0"/>
+              <a:t>‹#›</a:t>
             </a:fld>
             <a:endParaRPr kumimoji="1" lang="zh-CN" altLang="en-US"/>
           </a:p>
@@ -756,7 +759,6 @@
               <a:rPr kumimoji="1" lang="zh-CN" altLang="en-US"/>
               <a:t>单击此处编辑母版标题样式</a:t>
             </a:r>
-            <a:endParaRPr kumimoji="1" lang="zh-CN" altLang="en-US"/>
           </a:p>
         </p:txBody>
       </p:sp>
@@ -780,7 +782,6 @@
               <a:rPr kumimoji="1" lang="zh-CN" altLang="en-US"/>
               <a:t>单击此处编辑母版文本样式</a:t>
             </a:r>
-            <a:endParaRPr kumimoji="1" lang="zh-CN" altLang="en-US"/>
           </a:p>
           <a:p>
             <a:pPr lvl="1"/>
@@ -788,7 +789,6 @@
               <a:rPr kumimoji="1" lang="zh-CN" altLang="en-US"/>
               <a:t>二级</a:t>
             </a:r>
-            <a:endParaRPr kumimoji="1" lang="zh-CN" altLang="en-US"/>
           </a:p>
           <a:p>
             <a:pPr lvl="2"/>
@@ -796,7 +796,6 @@
               <a:rPr kumimoji="1" lang="zh-CN" altLang="en-US"/>
               <a:t>三级</a:t>
             </a:r>
-            <a:endParaRPr kumimoji="1" lang="zh-CN" altLang="en-US"/>
           </a:p>
           <a:p>
             <a:pPr lvl="3"/>
@@ -804,7 +803,6 @@
               <a:rPr kumimoji="1" lang="zh-CN" altLang="en-US"/>
               <a:t>四级</a:t>
             </a:r>
-            <a:endParaRPr kumimoji="1" lang="zh-CN" altLang="en-US"/>
           </a:p>
           <a:p>
             <a:pPr lvl="4"/>
@@ -812,7 +810,6 @@
               <a:rPr kumimoji="1" lang="zh-CN" altLang="en-US"/>
               <a:t>五级</a:t>
             </a:r>
-            <a:endParaRPr kumimoji="1" lang="zh-CN" altLang="en-US"/>
           </a:p>
         </p:txBody>
       </p:sp>
@@ -833,6 +830,7 @@
           <a:p>
             <a:fld id="{B8C17918-3A8B-164F-B62C-07D5B113208C}" type="datetimeFigureOut">
               <a:rPr kumimoji="1" lang="zh-CN" altLang="en-US" smtClean="0"/>
+              <a:t>2025/6/13</a:t>
             </a:fld>
             <a:endParaRPr kumimoji="1" lang="zh-CN" altLang="en-US"/>
           </a:p>
@@ -874,6 +872,7 @@
           <a:p>
             <a:fld id="{0E00DDE1-2C70-D44F-8677-F4A7388D2818}" type="slidenum">
               <a:rPr kumimoji="1" lang="zh-CN" altLang="en-US" smtClean="0"/>
+              <a:t>‹#›</a:t>
             </a:fld>
             <a:endParaRPr kumimoji="1" lang="zh-CN" altLang="en-US"/>
           </a:p>
@@ -928,7 +927,6 @@
               <a:rPr kumimoji="1" lang="zh-CN" altLang="en-US"/>
               <a:t>单击此处编辑母版标题样式</a:t>
             </a:r>
-            <a:endParaRPr kumimoji="1" lang="zh-CN" altLang="en-US"/>
           </a:p>
         </p:txBody>
       </p:sp>
@@ -957,7 +955,6 @@
               <a:rPr kumimoji="1" lang="zh-CN" altLang="en-US"/>
               <a:t>单击此处编辑母版文本样式</a:t>
             </a:r>
-            <a:endParaRPr kumimoji="1" lang="zh-CN" altLang="en-US"/>
           </a:p>
           <a:p>
             <a:pPr lvl="1"/>
@@ -965,7 +962,6 @@
               <a:rPr kumimoji="1" lang="zh-CN" altLang="en-US"/>
               <a:t>二级</a:t>
             </a:r>
-            <a:endParaRPr kumimoji="1" lang="zh-CN" altLang="en-US"/>
           </a:p>
           <a:p>
             <a:pPr lvl="2"/>
@@ -973,7 +969,6 @@
               <a:rPr kumimoji="1" lang="zh-CN" altLang="en-US"/>
               <a:t>三级</a:t>
             </a:r>
-            <a:endParaRPr kumimoji="1" lang="zh-CN" altLang="en-US"/>
           </a:p>
           <a:p>
             <a:pPr lvl="3"/>
@@ -981,7 +976,6 @@
               <a:rPr kumimoji="1" lang="zh-CN" altLang="en-US"/>
               <a:t>四级</a:t>
             </a:r>
-            <a:endParaRPr kumimoji="1" lang="zh-CN" altLang="en-US"/>
           </a:p>
           <a:p>
             <a:pPr lvl="4"/>
@@ -989,7 +983,6 @@
               <a:rPr kumimoji="1" lang="zh-CN" altLang="en-US"/>
               <a:t>五级</a:t>
             </a:r>
-            <a:endParaRPr kumimoji="1" lang="zh-CN" altLang="en-US"/>
           </a:p>
         </p:txBody>
       </p:sp>
@@ -1010,6 +1003,7 @@
           <a:p>
             <a:fld id="{B8C17918-3A8B-164F-B62C-07D5B113208C}" type="datetimeFigureOut">
               <a:rPr kumimoji="1" lang="zh-CN" altLang="en-US" smtClean="0"/>
+              <a:t>2025/6/13</a:t>
             </a:fld>
             <a:endParaRPr kumimoji="1" lang="zh-CN" altLang="en-US"/>
           </a:p>
@@ -1051,6 +1045,7 @@
           <a:p>
             <a:fld id="{0E00DDE1-2C70-D44F-8677-F4A7388D2818}" type="slidenum">
               <a:rPr kumimoji="1" lang="zh-CN" altLang="en-US" smtClean="0"/>
+              <a:t>‹#›</a:t>
             </a:fld>
             <a:endParaRPr kumimoji="1" lang="zh-CN" altLang="en-US"/>
           </a:p>
@@ -1100,7 +1095,6 @@
               <a:rPr kumimoji="1" lang="zh-CN" altLang="en-US"/>
               <a:t>单击此处编辑母版标题样式</a:t>
             </a:r>
-            <a:endParaRPr kumimoji="1" lang="zh-CN" altLang="en-US"/>
           </a:p>
         </p:txBody>
       </p:sp>
@@ -1124,7 +1118,6 @@
               <a:rPr kumimoji="1" lang="zh-CN" altLang="en-US"/>
               <a:t>单击此处编辑母版文本样式</a:t>
             </a:r>
-            <a:endParaRPr kumimoji="1" lang="zh-CN" altLang="en-US"/>
           </a:p>
           <a:p>
             <a:pPr lvl="1"/>
@@ -1132,7 +1125,6 @@
               <a:rPr kumimoji="1" lang="zh-CN" altLang="en-US"/>
               <a:t>二级</a:t>
             </a:r>
-            <a:endParaRPr kumimoji="1" lang="zh-CN" altLang="en-US"/>
           </a:p>
           <a:p>
             <a:pPr lvl="2"/>
@@ -1140,7 +1132,6 @@
               <a:rPr kumimoji="1" lang="zh-CN" altLang="en-US"/>
               <a:t>三级</a:t>
             </a:r>
-            <a:endParaRPr kumimoji="1" lang="zh-CN" altLang="en-US"/>
           </a:p>
           <a:p>
             <a:pPr lvl="3"/>
@@ -1148,7 +1139,6 @@
               <a:rPr kumimoji="1" lang="zh-CN" altLang="en-US"/>
               <a:t>四级</a:t>
             </a:r>
-            <a:endParaRPr kumimoji="1" lang="zh-CN" altLang="en-US"/>
           </a:p>
           <a:p>
             <a:pPr lvl="4"/>
@@ -1156,7 +1146,6 @@
               <a:rPr kumimoji="1" lang="zh-CN" altLang="en-US"/>
               <a:t>五级</a:t>
             </a:r>
-            <a:endParaRPr kumimoji="1" lang="zh-CN" altLang="en-US"/>
           </a:p>
         </p:txBody>
       </p:sp>
@@ -1177,6 +1166,7 @@
           <a:p>
             <a:fld id="{B8C17918-3A8B-164F-B62C-07D5B113208C}" type="datetimeFigureOut">
               <a:rPr kumimoji="1" lang="zh-CN" altLang="en-US" smtClean="0"/>
+              <a:t>2025/6/13</a:t>
             </a:fld>
             <a:endParaRPr kumimoji="1" lang="zh-CN" altLang="en-US"/>
           </a:p>
@@ -1218,6 +1208,7 @@
           <a:p>
             <a:fld id="{0E00DDE1-2C70-D44F-8677-F4A7388D2818}" type="slidenum">
               <a:rPr kumimoji="1" lang="zh-CN" altLang="en-US" smtClean="0"/>
+              <a:t>‹#›</a:t>
             </a:fld>
             <a:endParaRPr kumimoji="1" lang="zh-CN" altLang="en-US"/>
           </a:p>
@@ -1276,7 +1267,6 @@
               <a:rPr kumimoji="1" lang="zh-CN" altLang="en-US"/>
               <a:t>单击此处编辑母版标题样式</a:t>
             </a:r>
-            <a:endParaRPr kumimoji="1" lang="zh-CN" altLang="en-US"/>
           </a:p>
         </p:txBody>
       </p:sp>
@@ -1396,7 +1386,6 @@
               <a:rPr kumimoji="1" lang="zh-CN" altLang="en-US"/>
               <a:t>单击此处编辑母版文本样式</a:t>
             </a:r>
-            <a:endParaRPr kumimoji="1" lang="zh-CN" altLang="en-US"/>
           </a:p>
         </p:txBody>
       </p:sp>
@@ -1417,6 +1406,7 @@
           <a:p>
             <a:fld id="{B8C17918-3A8B-164F-B62C-07D5B113208C}" type="datetimeFigureOut">
               <a:rPr kumimoji="1" lang="zh-CN" altLang="en-US" smtClean="0"/>
+              <a:t>2025/6/13</a:t>
             </a:fld>
             <a:endParaRPr kumimoji="1" lang="zh-CN" altLang="en-US"/>
           </a:p>
@@ -1458,6 +1448,7 @@
           <a:p>
             <a:fld id="{0E00DDE1-2C70-D44F-8677-F4A7388D2818}" type="slidenum">
               <a:rPr kumimoji="1" lang="zh-CN" altLang="en-US" smtClean="0"/>
+              <a:t>‹#›</a:t>
             </a:fld>
             <a:endParaRPr kumimoji="1" lang="zh-CN" altLang="en-US"/>
           </a:p>
@@ -1507,7 +1498,6 @@
               <a:rPr kumimoji="1" lang="zh-CN" altLang="en-US"/>
               <a:t>单击此处编辑母版标题样式</a:t>
             </a:r>
-            <a:endParaRPr kumimoji="1" lang="zh-CN" altLang="en-US"/>
           </a:p>
         </p:txBody>
       </p:sp>
@@ -1536,7 +1526,6 @@
               <a:rPr kumimoji="1" lang="zh-CN" altLang="en-US"/>
               <a:t>单击此处编辑母版文本样式</a:t>
             </a:r>
-            <a:endParaRPr kumimoji="1" lang="zh-CN" altLang="en-US"/>
           </a:p>
           <a:p>
             <a:pPr lvl="1"/>
@@ -1544,7 +1533,6 @@
               <a:rPr kumimoji="1" lang="zh-CN" altLang="en-US"/>
               <a:t>二级</a:t>
             </a:r>
-            <a:endParaRPr kumimoji="1" lang="zh-CN" altLang="en-US"/>
           </a:p>
           <a:p>
             <a:pPr lvl="2"/>
@@ -1552,7 +1540,6 @@
               <a:rPr kumimoji="1" lang="zh-CN" altLang="en-US"/>
               <a:t>三级</a:t>
             </a:r>
-            <a:endParaRPr kumimoji="1" lang="zh-CN" altLang="en-US"/>
           </a:p>
           <a:p>
             <a:pPr lvl="3"/>
@@ -1560,7 +1547,6 @@
               <a:rPr kumimoji="1" lang="zh-CN" altLang="en-US"/>
               <a:t>四级</a:t>
             </a:r>
-            <a:endParaRPr kumimoji="1" lang="zh-CN" altLang="en-US"/>
           </a:p>
           <a:p>
             <a:pPr lvl="4"/>
@@ -1568,7 +1554,6 @@
               <a:rPr kumimoji="1" lang="zh-CN" altLang="en-US"/>
               <a:t>五级</a:t>
             </a:r>
-            <a:endParaRPr kumimoji="1" lang="zh-CN" altLang="en-US"/>
           </a:p>
         </p:txBody>
       </p:sp>
@@ -1597,7 +1582,6 @@
               <a:rPr kumimoji="1" lang="zh-CN" altLang="en-US"/>
               <a:t>单击此处编辑母版文本样式</a:t>
             </a:r>
-            <a:endParaRPr kumimoji="1" lang="zh-CN" altLang="en-US"/>
           </a:p>
           <a:p>
             <a:pPr lvl="1"/>
@@ -1605,7 +1589,6 @@
               <a:rPr kumimoji="1" lang="zh-CN" altLang="en-US"/>
               <a:t>二级</a:t>
             </a:r>
-            <a:endParaRPr kumimoji="1" lang="zh-CN" altLang="en-US"/>
           </a:p>
           <a:p>
             <a:pPr lvl="2"/>
@@ -1613,7 +1596,6 @@
               <a:rPr kumimoji="1" lang="zh-CN" altLang="en-US"/>
               <a:t>三级</a:t>
             </a:r>
-            <a:endParaRPr kumimoji="1" lang="zh-CN" altLang="en-US"/>
           </a:p>
           <a:p>
             <a:pPr lvl="3"/>
@@ -1621,7 +1603,6 @@
               <a:rPr kumimoji="1" lang="zh-CN" altLang="en-US"/>
               <a:t>四级</a:t>
             </a:r>
-            <a:endParaRPr kumimoji="1" lang="zh-CN" altLang="en-US"/>
           </a:p>
           <a:p>
             <a:pPr lvl="4"/>
@@ -1629,7 +1610,6 @@
               <a:rPr kumimoji="1" lang="zh-CN" altLang="en-US"/>
               <a:t>五级</a:t>
             </a:r>
-            <a:endParaRPr kumimoji="1" lang="zh-CN" altLang="en-US"/>
           </a:p>
         </p:txBody>
       </p:sp>
@@ -1650,6 +1630,7 @@
           <a:p>
             <a:fld id="{B8C17918-3A8B-164F-B62C-07D5B113208C}" type="datetimeFigureOut">
               <a:rPr kumimoji="1" lang="zh-CN" altLang="en-US" smtClean="0"/>
+              <a:t>2025/6/13</a:t>
             </a:fld>
             <a:endParaRPr kumimoji="1" lang="zh-CN" altLang="en-US"/>
           </a:p>
@@ -1691,6 +1672,7 @@
           <a:p>
             <a:fld id="{0E00DDE1-2C70-D44F-8677-F4A7388D2818}" type="slidenum">
               <a:rPr kumimoji="1" lang="zh-CN" altLang="en-US" smtClean="0"/>
+              <a:t>‹#›</a:t>
             </a:fld>
             <a:endParaRPr kumimoji="1" lang="zh-CN" altLang="en-US"/>
           </a:p>
@@ -1745,7 +1727,6 @@
               <a:rPr kumimoji="1" lang="zh-CN" altLang="en-US"/>
               <a:t>单击此处编辑母版标题样式</a:t>
             </a:r>
-            <a:endParaRPr kumimoji="1" lang="zh-CN" altLang="en-US"/>
           </a:p>
         </p:txBody>
       </p:sp>
@@ -1811,7 +1792,6 @@
               <a:rPr kumimoji="1" lang="zh-CN" altLang="en-US"/>
               <a:t>单击此处编辑母版文本样式</a:t>
             </a:r>
-            <a:endParaRPr kumimoji="1" lang="zh-CN" altLang="en-US"/>
           </a:p>
         </p:txBody>
       </p:sp>
@@ -1840,7 +1820,6 @@
               <a:rPr kumimoji="1" lang="zh-CN" altLang="en-US"/>
               <a:t>单击此处编辑母版文本样式</a:t>
             </a:r>
-            <a:endParaRPr kumimoji="1" lang="zh-CN" altLang="en-US"/>
           </a:p>
           <a:p>
             <a:pPr lvl="1"/>
@@ -1848,7 +1827,6 @@
               <a:rPr kumimoji="1" lang="zh-CN" altLang="en-US"/>
               <a:t>二级</a:t>
             </a:r>
-            <a:endParaRPr kumimoji="1" lang="zh-CN" altLang="en-US"/>
           </a:p>
           <a:p>
             <a:pPr lvl="2"/>
@@ -1856,7 +1834,6 @@
               <a:rPr kumimoji="1" lang="zh-CN" altLang="en-US"/>
               <a:t>三级</a:t>
             </a:r>
-            <a:endParaRPr kumimoji="1" lang="zh-CN" altLang="en-US"/>
           </a:p>
           <a:p>
             <a:pPr lvl="3"/>
@@ -1864,7 +1841,6 @@
               <a:rPr kumimoji="1" lang="zh-CN" altLang="en-US"/>
               <a:t>四级</a:t>
             </a:r>
-            <a:endParaRPr kumimoji="1" lang="zh-CN" altLang="en-US"/>
           </a:p>
           <a:p>
             <a:pPr lvl="4"/>
@@ -1872,7 +1848,6 @@
               <a:rPr kumimoji="1" lang="zh-CN" altLang="en-US"/>
               <a:t>五级</a:t>
             </a:r>
-            <a:endParaRPr kumimoji="1" lang="zh-CN" altLang="en-US"/>
           </a:p>
         </p:txBody>
       </p:sp>
@@ -1938,7 +1913,6 @@
               <a:rPr kumimoji="1" lang="zh-CN" altLang="en-US"/>
               <a:t>单击此处编辑母版文本样式</a:t>
             </a:r>
-            <a:endParaRPr kumimoji="1" lang="zh-CN" altLang="en-US"/>
           </a:p>
         </p:txBody>
       </p:sp>
@@ -1967,7 +1941,6 @@
               <a:rPr kumimoji="1" lang="zh-CN" altLang="en-US"/>
               <a:t>单击此处编辑母版文本样式</a:t>
             </a:r>
-            <a:endParaRPr kumimoji="1" lang="zh-CN" altLang="en-US"/>
           </a:p>
           <a:p>
             <a:pPr lvl="1"/>
@@ -1975,7 +1948,6 @@
               <a:rPr kumimoji="1" lang="zh-CN" altLang="en-US"/>
               <a:t>二级</a:t>
             </a:r>
-            <a:endParaRPr kumimoji="1" lang="zh-CN" altLang="en-US"/>
           </a:p>
           <a:p>
             <a:pPr lvl="2"/>
@@ -1983,7 +1955,6 @@
               <a:rPr kumimoji="1" lang="zh-CN" altLang="en-US"/>
               <a:t>三级</a:t>
             </a:r>
-            <a:endParaRPr kumimoji="1" lang="zh-CN" altLang="en-US"/>
           </a:p>
           <a:p>
             <a:pPr lvl="3"/>
@@ -1991,7 +1962,6 @@
               <a:rPr kumimoji="1" lang="zh-CN" altLang="en-US"/>
               <a:t>四级</a:t>
             </a:r>
-            <a:endParaRPr kumimoji="1" lang="zh-CN" altLang="en-US"/>
           </a:p>
           <a:p>
             <a:pPr lvl="4"/>
@@ -1999,7 +1969,6 @@
               <a:rPr kumimoji="1" lang="zh-CN" altLang="en-US"/>
               <a:t>五级</a:t>
             </a:r>
-            <a:endParaRPr kumimoji="1" lang="zh-CN" altLang="en-US"/>
           </a:p>
         </p:txBody>
       </p:sp>
@@ -2020,6 +1989,7 @@
           <a:p>
             <a:fld id="{B8C17918-3A8B-164F-B62C-07D5B113208C}" type="datetimeFigureOut">
               <a:rPr kumimoji="1" lang="zh-CN" altLang="en-US" smtClean="0"/>
+              <a:t>2025/6/13</a:t>
             </a:fld>
             <a:endParaRPr kumimoji="1" lang="zh-CN" altLang="en-US"/>
           </a:p>
@@ -2061,6 +2031,7 @@
           <a:p>
             <a:fld id="{0E00DDE1-2C70-D44F-8677-F4A7388D2818}" type="slidenum">
               <a:rPr kumimoji="1" lang="zh-CN" altLang="en-US" smtClean="0"/>
+              <a:t>‹#›</a:t>
             </a:fld>
             <a:endParaRPr kumimoji="1" lang="zh-CN" altLang="en-US"/>
           </a:p>
@@ -2110,7 +2081,6 @@
               <a:rPr kumimoji="1" lang="zh-CN" altLang="en-US"/>
               <a:t>单击此处编辑母版标题样式</a:t>
             </a:r>
-            <a:endParaRPr kumimoji="1" lang="zh-CN" altLang="en-US"/>
           </a:p>
         </p:txBody>
       </p:sp>
@@ -2131,6 +2101,7 @@
           <a:p>
             <a:fld id="{B8C17918-3A8B-164F-B62C-07D5B113208C}" type="datetimeFigureOut">
               <a:rPr kumimoji="1" lang="zh-CN" altLang="en-US" smtClean="0"/>
+              <a:t>2025/6/13</a:t>
             </a:fld>
             <a:endParaRPr kumimoji="1" lang="zh-CN" altLang="en-US"/>
           </a:p>
@@ -2172,6 +2143,7 @@
           <a:p>
             <a:fld id="{0E00DDE1-2C70-D44F-8677-F4A7388D2818}" type="slidenum">
               <a:rPr kumimoji="1" lang="zh-CN" altLang="en-US" smtClean="0"/>
+              <a:t>‹#›</a:t>
             </a:fld>
             <a:endParaRPr kumimoji="1" lang="zh-CN" altLang="en-US"/>
           </a:p>
@@ -2219,6 +2191,7 @@
           <a:p>
             <a:fld id="{B8C17918-3A8B-164F-B62C-07D5B113208C}" type="datetimeFigureOut">
               <a:rPr kumimoji="1" lang="zh-CN" altLang="en-US" smtClean="0"/>
+              <a:t>2025/6/13</a:t>
             </a:fld>
             <a:endParaRPr kumimoji="1" lang="zh-CN" altLang="en-US"/>
           </a:p>
@@ -2260,6 +2233,7 @@
           <a:p>
             <a:fld id="{0E00DDE1-2C70-D44F-8677-F4A7388D2818}" type="slidenum">
               <a:rPr kumimoji="1" lang="zh-CN" altLang="en-US" smtClean="0"/>
+              <a:t>‹#›</a:t>
             </a:fld>
             <a:endParaRPr kumimoji="1" lang="zh-CN" altLang="en-US"/>
           </a:p>
@@ -2318,7 +2292,6 @@
               <a:rPr kumimoji="1" lang="zh-CN" altLang="en-US"/>
               <a:t>单击此处编辑母版标题样式</a:t>
             </a:r>
-            <a:endParaRPr kumimoji="1" lang="zh-CN" altLang="en-US"/>
           </a:p>
         </p:txBody>
       </p:sp>
@@ -2375,7 +2348,6 @@
               <a:rPr kumimoji="1" lang="zh-CN" altLang="en-US"/>
               <a:t>单击此处编辑母版文本样式</a:t>
             </a:r>
-            <a:endParaRPr kumimoji="1" lang="zh-CN" altLang="en-US"/>
           </a:p>
           <a:p>
             <a:pPr lvl="1"/>
@@ -2383,7 +2355,6 @@
               <a:rPr kumimoji="1" lang="zh-CN" altLang="en-US"/>
               <a:t>二级</a:t>
             </a:r>
-            <a:endParaRPr kumimoji="1" lang="zh-CN" altLang="en-US"/>
           </a:p>
           <a:p>
             <a:pPr lvl="2"/>
@@ -2391,7 +2362,6 @@
               <a:rPr kumimoji="1" lang="zh-CN" altLang="en-US"/>
               <a:t>三级</a:t>
             </a:r>
-            <a:endParaRPr kumimoji="1" lang="zh-CN" altLang="en-US"/>
           </a:p>
           <a:p>
             <a:pPr lvl="3"/>
@@ -2399,7 +2369,6 @@
               <a:rPr kumimoji="1" lang="zh-CN" altLang="en-US"/>
               <a:t>四级</a:t>
             </a:r>
-            <a:endParaRPr kumimoji="1" lang="zh-CN" altLang="en-US"/>
           </a:p>
           <a:p>
             <a:pPr lvl="4"/>
@@ -2407,7 +2376,6 @@
               <a:rPr kumimoji="1" lang="zh-CN" altLang="en-US"/>
               <a:t>五级</a:t>
             </a:r>
-            <a:endParaRPr kumimoji="1" lang="zh-CN" altLang="en-US"/>
           </a:p>
         </p:txBody>
       </p:sp>
@@ -2473,7 +2441,6 @@
               <a:rPr kumimoji="1" lang="zh-CN" altLang="en-US"/>
               <a:t>单击此处编辑母版文本样式</a:t>
             </a:r>
-            <a:endParaRPr kumimoji="1" lang="zh-CN" altLang="en-US"/>
           </a:p>
         </p:txBody>
       </p:sp>
@@ -2494,6 +2461,7 @@
           <a:p>
             <a:fld id="{B8C17918-3A8B-164F-B62C-07D5B113208C}" type="datetimeFigureOut">
               <a:rPr kumimoji="1" lang="zh-CN" altLang="en-US" smtClean="0"/>
+              <a:t>2025/6/13</a:t>
             </a:fld>
             <a:endParaRPr kumimoji="1" lang="zh-CN" altLang="en-US"/>
           </a:p>
@@ -2535,6 +2503,7 @@
           <a:p>
             <a:fld id="{0E00DDE1-2C70-D44F-8677-F4A7388D2818}" type="slidenum">
               <a:rPr kumimoji="1" lang="zh-CN" altLang="en-US" smtClean="0"/>
+              <a:t>‹#›</a:t>
             </a:fld>
             <a:endParaRPr kumimoji="1" lang="zh-CN" altLang="en-US"/>
           </a:p>
@@ -2593,7 +2562,6 @@
               <a:rPr kumimoji="1" lang="zh-CN" altLang="en-US"/>
               <a:t>单击此处编辑母版标题样式</a:t>
             </a:r>
-            <a:endParaRPr kumimoji="1" lang="zh-CN" altLang="en-US"/>
           </a:p>
         </p:txBody>
       </p:sp>
@@ -2720,7 +2688,6 @@
               <a:rPr kumimoji="1" lang="zh-CN" altLang="en-US"/>
               <a:t>单击此处编辑母版文本样式</a:t>
             </a:r>
-            <a:endParaRPr kumimoji="1" lang="zh-CN" altLang="en-US"/>
           </a:p>
         </p:txBody>
       </p:sp>
@@ -2741,6 +2708,7 @@
           <a:p>
             <a:fld id="{B8C17918-3A8B-164F-B62C-07D5B113208C}" type="datetimeFigureOut">
               <a:rPr kumimoji="1" lang="zh-CN" altLang="en-US" smtClean="0"/>
+              <a:t>2025/6/13</a:t>
             </a:fld>
             <a:endParaRPr kumimoji="1" lang="zh-CN" altLang="en-US"/>
           </a:p>
@@ -2782,6 +2750,7 @@
           <a:p>
             <a:fld id="{0E00DDE1-2C70-D44F-8677-F4A7388D2818}" type="slidenum">
               <a:rPr kumimoji="1" lang="zh-CN" altLang="en-US" smtClean="0"/>
+              <a:t>‹#›</a:t>
             </a:fld>
             <a:endParaRPr kumimoji="1" lang="zh-CN" altLang="en-US"/>
           </a:p>
@@ -2846,7 +2815,6 @@
               <a:rPr kumimoji="1" lang="zh-CN" altLang="en-US"/>
               <a:t>单击此处编辑母版标题样式</a:t>
             </a:r>
-            <a:endParaRPr kumimoji="1" lang="zh-CN" altLang="en-US"/>
           </a:p>
         </p:txBody>
       </p:sp>
@@ -2880,7 +2848,6 @@
               <a:rPr kumimoji="1" lang="zh-CN" altLang="en-US"/>
               <a:t>单击此处编辑母版文本样式</a:t>
             </a:r>
-            <a:endParaRPr kumimoji="1" lang="zh-CN" altLang="en-US"/>
           </a:p>
           <a:p>
             <a:pPr lvl="1"/>
@@ -2888,7 +2855,6 @@
               <a:rPr kumimoji="1" lang="zh-CN" altLang="en-US"/>
               <a:t>二级</a:t>
             </a:r>
-            <a:endParaRPr kumimoji="1" lang="zh-CN" altLang="en-US"/>
           </a:p>
           <a:p>
             <a:pPr lvl="2"/>
@@ -2896,7 +2862,6 @@
               <a:rPr kumimoji="1" lang="zh-CN" altLang="en-US"/>
               <a:t>三级</a:t>
             </a:r>
-            <a:endParaRPr kumimoji="1" lang="zh-CN" altLang="en-US"/>
           </a:p>
           <a:p>
             <a:pPr lvl="3"/>
@@ -2904,7 +2869,6 @@
               <a:rPr kumimoji="1" lang="zh-CN" altLang="en-US"/>
               <a:t>四级</a:t>
             </a:r>
-            <a:endParaRPr kumimoji="1" lang="zh-CN" altLang="en-US"/>
           </a:p>
           <a:p>
             <a:pPr lvl="4"/>
@@ -2912,7 +2876,6 @@
               <a:rPr kumimoji="1" lang="zh-CN" altLang="en-US"/>
               <a:t>五级</a:t>
             </a:r>
-            <a:endParaRPr kumimoji="1" lang="zh-CN" altLang="en-US"/>
           </a:p>
         </p:txBody>
       </p:sp>
@@ -2951,6 +2914,7 @@
           <a:p>
             <a:fld id="{B8C17918-3A8B-164F-B62C-07D5B113208C}" type="datetimeFigureOut">
               <a:rPr kumimoji="1" lang="zh-CN" altLang="en-US" smtClean="0"/>
+              <a:t>2025/6/13</a:t>
             </a:fld>
             <a:endParaRPr kumimoji="1" lang="zh-CN" altLang="en-US"/>
           </a:p>
@@ -3028,6 +2992,7 @@
           <a:p>
             <a:fld id="{0E00DDE1-2C70-D44F-8677-F4A7388D2818}" type="slidenum">
               <a:rPr kumimoji="1" lang="zh-CN" altLang="en-US" smtClean="0"/>
+              <a:t>‹#›</a:t>
             </a:fld>
             <a:endParaRPr kumimoji="1" lang="zh-CN" altLang="en-US"/>
           </a:p>
@@ -3357,8 +3322,8 @@
         </p:nvSpPr>
         <p:spPr>
           <a:xfrm>
-            <a:off x="395689" y="99151"/>
-            <a:ext cx="11400622" cy="400110"/>
+            <a:off x="197385" y="103261"/>
+            <a:ext cx="11797230" cy="430887"/>
           </a:xfrm>
           <a:prstGeom prst="rect">
             <a:avLst/>
@@ -3373,26 +3338,26 @@
           <a:p>
             <a:pPr algn="ctr"/>
             <a:r>
-              <a:rPr lang="en-GB" altLang="zh-CN" sz="2000" b="1" dirty="0"/>
+              <a:rPr lang="en-GB" altLang="zh-CN" sz="2200" b="1" dirty="0"/>
               <a:t>Behavior Prediction from Everyday Sounds via LLMs</a:t>
             </a:r>
             <a:r>
-              <a:rPr lang="zh-CN" altLang="en-US" sz="2000" b="1" dirty="0"/>
+              <a:rPr lang="zh-CN" altLang="en-US" sz="2200" b="1" dirty="0"/>
               <a:t> </a:t>
             </a:r>
             <a:r>
-              <a:rPr lang="en-GB" altLang="zh-CN" sz="2000" b="1" dirty="0"/>
+              <a:rPr lang="en-GB" altLang="zh-CN" sz="2200" b="1" dirty="0"/>
               <a:t>with Multi</a:t>
             </a:r>
             <a:r>
-              <a:rPr lang="en-US" altLang="zh-CN" sz="2000" b="1" dirty="0"/>
+              <a:rPr lang="en-US" altLang="zh-CN" sz="2200" b="1" dirty="0"/>
               <a:t>-</a:t>
             </a:r>
             <a:r>
-              <a:rPr lang="en-GB" altLang="zh-CN" sz="2000" b="1" dirty="0"/>
-              <a:t>sensor Context and User Priors</a:t>
-            </a:r>
-            <a:endParaRPr kumimoji="1" lang="zh-CN" altLang="en-US" sz="2000" b="1" dirty="0"/>
+              <a:rPr lang="en-GB" altLang="zh-CN" sz="2200" b="1" dirty="0"/>
+              <a:t>sensor Context and Priors</a:t>
+            </a:r>
+            <a:endParaRPr kumimoji="1" lang="zh-CN" altLang="en-US" sz="2200" b="1" dirty="0"/>
           </a:p>
         </p:txBody>
       </p:sp>
@@ -3404,8 +3369,8 @@
         </p:nvSpPr>
         <p:spPr>
           <a:xfrm>
-            <a:off x="197385" y="499261"/>
-            <a:ext cx="6566972" cy="3293209"/>
+            <a:off x="197385" y="551513"/>
+            <a:ext cx="6566972" cy="3354765"/>
           </a:xfrm>
           <a:prstGeom prst="rect">
             <a:avLst/>
@@ -3419,16 +3384,12 @@
           <a:lstStyle/>
           <a:p>
             <a:r>
-              <a:rPr kumimoji="1" lang="en-US" altLang="zh-CN" sz="1600" b="1" dirty="0">
+              <a:rPr kumimoji="1" lang="en-US" altLang="zh-CN" sz="2000" b="1" dirty="0">
                 <a:latin typeface="Arial" panose="020B0704020202020204" pitchFamily="34" charset="0"/>
                 <a:cs typeface="Arial" panose="020B0704020202020204" pitchFamily="34" charset="0"/>
               </a:rPr>
               <a:t>Intro: </a:t>
             </a:r>
-            <a:endParaRPr kumimoji="1" lang="en-US" altLang="zh-CN" sz="1600" b="1" dirty="0">
-              <a:latin typeface="Arial" panose="020B0704020202020204" pitchFamily="34" charset="0"/>
-              <a:cs typeface="Arial" panose="020B0704020202020204" pitchFamily="34" charset="0"/>
-            </a:endParaRPr>
           </a:p>
           <a:p>
             <a:r>
@@ -3459,10 +3420,6 @@
               </a:rPr>
               <a:t>prior knowledge, people can imagine what’s happening just by sounds.</a:t>
             </a:r>
-            <a:endParaRPr lang="en-GB" altLang="zh-CN" sz="1600" dirty="0">
-              <a:latin typeface="Arial" panose="020B0704020202020204" pitchFamily="34" charset="0"/>
-              <a:cs typeface="Arial" panose="020B0704020202020204" pitchFamily="34" charset="0"/>
-            </a:endParaRPr>
           </a:p>
           <a:p>
             <a:r>
@@ -3500,10 +3457,6 @@
               </a:rPr>
               <a:t>Sensor readings help infer context such as location and activity, which, combined with user habits, form auxiliary knowledge. This knowledge, along with raw audio, is fed into a multimodal large model to predict the user's current behavior and state.</a:t>
             </a:r>
-            <a:endParaRPr lang="en-GB" altLang="zh-CN" sz="1600" dirty="0">
-              <a:latin typeface="Arial" panose="020B0704020202020204" pitchFamily="34" charset="0"/>
-              <a:cs typeface="Arial" panose="020B0704020202020204" pitchFamily="34" charset="0"/>
-            </a:endParaRPr>
           </a:p>
           <a:p>
             <a:r>
@@ -3513,10 +3466,6 @@
               </a:rPr>
               <a:t>With continuous recordings, we can analyze users’ daily routines and provide detailed daily activity lists and behavior reports for self-reflection and understanding.</a:t>
             </a:r>
-            <a:endParaRPr lang="en-GB" altLang="zh-CN" sz="1600" dirty="0">
-              <a:latin typeface="Arial" panose="020B0704020202020204" pitchFamily="34" charset="0"/>
-              <a:cs typeface="Arial" panose="020B0704020202020204" pitchFamily="34" charset="0"/>
-            </a:endParaRPr>
           </a:p>
         </p:txBody>
       </p:sp>
@@ -3529,7 +3478,7 @@
         <p:spPr>
           <a:xfrm>
             <a:off x="6764357" y="2299754"/>
-            <a:ext cx="5367812" cy="3785652"/>
+            <a:ext cx="5367812" cy="3847207"/>
           </a:xfrm>
           <a:prstGeom prst="rect">
             <a:avLst/>
@@ -3543,16 +3492,12 @@
           <a:lstStyle/>
           <a:p>
             <a:r>
-              <a:rPr kumimoji="1" lang="en-US" altLang="zh-CN" sz="1600" b="1" dirty="0">
+              <a:rPr kumimoji="1" lang="en-US" altLang="zh-CN" sz="2000" b="1" dirty="0">
                 <a:latin typeface="Arial" panose="020B0704020202020204" pitchFamily="34" charset="0"/>
                 <a:cs typeface="Arial" panose="020B0704020202020204" pitchFamily="34" charset="0"/>
               </a:rPr>
               <a:t>Dataset: </a:t>
             </a:r>
-            <a:endParaRPr kumimoji="1" lang="en-US" altLang="zh-CN" sz="1600" b="1" dirty="0">
-              <a:latin typeface="Arial" panose="020B0704020202020204" pitchFamily="34" charset="0"/>
-              <a:cs typeface="Arial" panose="020B0704020202020204" pitchFamily="34" charset="0"/>
-            </a:endParaRPr>
           </a:p>
           <a:p>
             <a:r>
@@ -3597,10 +3542,6 @@
               </a:rPr>
               <a:t>consisting of:</a:t>
             </a:r>
-            <a:endParaRPr lang="en-GB" altLang="zh-CN" sz="1600" dirty="0">
-              <a:latin typeface="Arial" panose="020B0704020202020204" pitchFamily="34" charset="0"/>
-              <a:cs typeface="Arial" panose="020B0704020202020204" pitchFamily="34" charset="0"/>
-            </a:endParaRPr>
           </a:p>
           <a:p>
             <a:pPr marL="285750" indent="-285750">
@@ -3614,10 +3555,6 @@
               </a:rPr>
               <a:t>User Questionnaire: Gathers basic demographics and routine behaviors as prior knowledge.</a:t>
             </a:r>
-            <a:endParaRPr lang="en-GB" altLang="zh-CN" sz="1600" dirty="0">
-              <a:latin typeface="Arial" panose="020B0704020202020204" pitchFamily="34" charset="0"/>
-              <a:cs typeface="Arial" panose="020B0704020202020204" pitchFamily="34" charset="0"/>
-            </a:endParaRPr>
           </a:p>
           <a:p>
             <a:pPr marL="285750" indent="-285750">
@@ -3631,10 +3568,6 @@
               </a:rPr>
               <a:t>IMU Data: Captures motion signals to identify specific limb movements.</a:t>
             </a:r>
-            <a:endParaRPr lang="en-GB" altLang="zh-CN" sz="1600" dirty="0">
-              <a:latin typeface="Arial" panose="020B0704020202020204" pitchFamily="34" charset="0"/>
-              <a:cs typeface="Arial" panose="020B0704020202020204" pitchFamily="34" charset="0"/>
-            </a:endParaRPr>
           </a:p>
           <a:p>
             <a:pPr marL="285750" indent="-285750">
@@ -3648,10 +3581,6 @@
               </a:rPr>
               <a:t>GPS Location: Provides spatial data to infer environment and mobility states (e.g., walking, running, commuting).</a:t>
             </a:r>
-            <a:endParaRPr lang="en-GB" altLang="zh-CN" sz="1600" dirty="0">
-              <a:latin typeface="Arial" panose="020B0704020202020204" pitchFamily="34" charset="0"/>
-              <a:cs typeface="Arial" panose="020B0704020202020204" pitchFamily="34" charset="0"/>
-            </a:endParaRPr>
           </a:p>
           <a:p>
             <a:pPr marL="285750" indent="-285750">
@@ -3665,10 +3594,6 @@
               </a:rPr>
               <a:t>Heart Rate: Records physiological responses to assist in activity classification.</a:t>
             </a:r>
-            <a:endParaRPr lang="en-GB" altLang="zh-CN" sz="1600" dirty="0">
-              <a:latin typeface="Arial" panose="020B0704020202020204" pitchFamily="34" charset="0"/>
-              <a:cs typeface="Arial" panose="020B0704020202020204" pitchFamily="34" charset="0"/>
-            </a:endParaRPr>
           </a:p>
           <a:p>
             <a:pPr marL="285750" indent="-285750">
@@ -3682,106 +3607,6 @@
               </a:rPr>
               <a:t>Raw Audio: Continuously records sound for behavioral inference by the model.</a:t>
             </a:r>
-            <a:endParaRPr lang="en-GB" altLang="zh-CN" sz="1600" dirty="0">
-              <a:latin typeface="Arial" panose="020B0704020202020204" pitchFamily="34" charset="0"/>
-              <a:cs typeface="Arial" panose="020B0704020202020204" pitchFamily="34" charset="0"/>
-            </a:endParaRPr>
-          </a:p>
-        </p:txBody>
-      </p:sp>
-      <p:pic>
-        <p:nvPicPr>
-          <p:cNvPr id="5" name="图片 4"/>
-          <p:cNvPicPr>
-            <a:picLocks noChangeAspect="1"/>
-          </p:cNvPicPr>
-          <p:nvPr/>
-        </p:nvPicPr>
-        <p:blipFill rotWithShape="1">
-          <a:blip r:embed="rId1"/>
-          <a:srcRect t="50000" b="6855"/>
-          <a:stretch>
-            <a:fillRect/>
-          </a:stretch>
-        </p:blipFill>
-        <p:spPr>
-          <a:xfrm>
-            <a:off x="6989275" y="518705"/>
-            <a:ext cx="3353902" cy="1898657"/>
-          </a:xfrm>
-          <a:prstGeom prst="rect">
-            <a:avLst/>
-          </a:prstGeom>
-        </p:spPr>
-      </p:pic>
-      <p:pic>
-        <p:nvPicPr>
-          <p:cNvPr id="7" name="图片 6"/>
-          <p:cNvPicPr>
-            <a:picLocks noChangeAspect="1"/>
-          </p:cNvPicPr>
-          <p:nvPr/>
-        </p:nvPicPr>
-        <p:blipFill rotWithShape="1">
-          <a:blip r:embed="rId1"/>
-          <a:srcRect b="55314"/>
-          <a:stretch>
-            <a:fillRect/>
-          </a:stretch>
-        </p:blipFill>
-        <p:spPr>
-          <a:xfrm>
-            <a:off x="951183" y="3792470"/>
-            <a:ext cx="5059376" cy="2966379"/>
-          </a:xfrm>
-          <a:prstGeom prst="rect">
-            <a:avLst/>
-          </a:prstGeom>
-        </p:spPr>
-      </p:pic>
-      <p:sp>
-        <p:nvSpPr>
-          <p:cNvPr id="9" name="文本框 8"/>
-          <p:cNvSpPr txBox="1"/>
-          <p:nvPr/>
-        </p:nvSpPr>
-        <p:spPr>
-          <a:xfrm>
-            <a:off x="6918574" y="6261594"/>
-            <a:ext cx="5059377" cy="369332"/>
-          </a:xfrm>
-          <a:prstGeom prst="rect">
-            <a:avLst/>
-          </a:prstGeom>
-          <a:solidFill>
-            <a:schemeClr val="accent2"/>
-          </a:solidFill>
-          <a:ln>
-            <a:solidFill>
-              <a:schemeClr val="accent1"/>
-            </a:solidFill>
-          </a:ln>
-        </p:spPr>
-        <p:txBody>
-          <a:bodyPr wrap="square" rtlCol="0">
-            <a:spAutoFit/>
-          </a:bodyPr>
-          <a:lstStyle/>
-          <a:p>
-            <a:pPr algn="ctr"/>
-            <a:r>
-              <a:rPr kumimoji="1" lang="en-US" altLang="zh-CN" b="1" dirty="0">
-                <a:solidFill>
-                  <a:schemeClr val="bg1"/>
-                </a:solidFill>
-              </a:rPr>
-              <a:t>AUTHOR AND TSINGHUA</a:t>
-            </a:r>
-            <a:endParaRPr kumimoji="1" lang="zh-CN" altLang="en-US" b="1" dirty="0">
-              <a:solidFill>
-                <a:schemeClr val="bg1"/>
-              </a:solidFill>
-            </a:endParaRPr>
           </a:p>
         </p:txBody>
       </p:sp>
@@ -3793,23 +3618,21 @@
           </p:cNvPicPr>
           <p:nvPr/>
         </p:nvPicPr>
-        <p:blipFill>
-          <a:blip r:embed="rId2">
+        <p:blipFill rotWithShape="1">
+          <a:blip r:embed="rId3">
             <a:extLst>
               <a:ext uri="{28A0092B-C50C-407E-A947-70E740481C1C}">
                 <a14:useLocalDpi xmlns:a14="http://schemas.microsoft.com/office/drawing/2010/main" val="0"/>
               </a:ext>
             </a:extLst>
           </a:blip>
-          <a:srcRect/>
-          <a:stretch>
-            <a:fillRect/>
-          </a:stretch>
+          <a:srcRect t="1" b="1461"/>
+          <a:stretch/>
         </p:blipFill>
         <p:spPr bwMode="auto">
           <a:xfrm>
-            <a:off x="10568095" y="494959"/>
-            <a:ext cx="1056681" cy="1937547"/>
+            <a:off x="10662547" y="686042"/>
+            <a:ext cx="989522" cy="1787892"/>
           </a:xfrm>
           <a:prstGeom prst="rect">
             <a:avLst/>
@@ -3826,6 +3649,208 @@
           </a:extLst>
         </p:spPr>
       </p:pic>
+      <p:pic>
+        <p:nvPicPr>
+          <p:cNvPr id="45" name="图片 44">
+            <a:extLst>
+              <a:ext uri="{FF2B5EF4-FFF2-40B4-BE49-F238E27FC236}">
+                <a16:creationId xmlns:a16="http://schemas.microsoft.com/office/drawing/2014/main" id="{E8AEE420-A3A3-C67A-668D-2F9559ABECCA}"/>
+              </a:ext>
+            </a:extLst>
+          </p:cNvPr>
+          <p:cNvPicPr>
+            <a:picLocks noChangeAspect="1"/>
+          </p:cNvPicPr>
+          <p:nvPr/>
+        </p:nvPicPr>
+        <p:blipFill rotWithShape="1">
+          <a:blip r:embed="rId4"/>
+          <a:srcRect t="4312"/>
+          <a:stretch/>
+        </p:blipFill>
+        <p:spPr>
+          <a:xfrm>
+            <a:off x="395689" y="3948980"/>
+            <a:ext cx="6028523" cy="2721135"/>
+          </a:xfrm>
+          <a:prstGeom prst="rect">
+            <a:avLst/>
+          </a:prstGeom>
+        </p:spPr>
+      </p:pic>
+      <p:pic>
+        <p:nvPicPr>
+          <p:cNvPr id="47" name="图片 46">
+            <a:extLst>
+              <a:ext uri="{FF2B5EF4-FFF2-40B4-BE49-F238E27FC236}">
+                <a16:creationId xmlns:a16="http://schemas.microsoft.com/office/drawing/2014/main" id="{42523778-660F-4174-7FCA-A19D5F4F3C18}"/>
+              </a:ext>
+            </a:extLst>
+          </p:cNvPr>
+          <p:cNvPicPr>
+            <a:picLocks noChangeAspect="1"/>
+          </p:cNvPicPr>
+          <p:nvPr/>
+        </p:nvPicPr>
+        <p:blipFill>
+          <a:blip r:embed="rId5"/>
+          <a:stretch>
+            <a:fillRect/>
+          </a:stretch>
+        </p:blipFill>
+        <p:spPr>
+          <a:xfrm>
+            <a:off x="6841465" y="573337"/>
+            <a:ext cx="3649521" cy="1833907"/>
+          </a:xfrm>
+          <a:prstGeom prst="rect">
+            <a:avLst/>
+          </a:prstGeom>
+        </p:spPr>
+      </p:pic>
+      <p:pic>
+        <p:nvPicPr>
+          <p:cNvPr id="49" name="图片 48" descr="EDE2CD6FC2310945BA206EC8242_9AA2B06D_18167">
+            <a:extLst>
+              <a:ext uri="{FF2B5EF4-FFF2-40B4-BE49-F238E27FC236}">
+                <a16:creationId xmlns:a16="http://schemas.microsoft.com/office/drawing/2014/main" id="{57C0D56C-6AB3-B868-E91A-659B59066DA7}"/>
+              </a:ext>
+            </a:extLst>
+          </p:cNvPr>
+          <p:cNvPicPr>
+            <a:picLocks noChangeAspect="1"/>
+          </p:cNvPicPr>
+          <p:nvPr/>
+        </p:nvPicPr>
+        <p:blipFill>
+          <a:blip r:embed="rId6"/>
+          <a:srcRect l="9184" t="12939" r="10250" b="16452"/>
+          <a:stretch>
+            <a:fillRect/>
+          </a:stretch>
+        </p:blipFill>
+        <p:spPr>
+          <a:xfrm>
+            <a:off x="10215154" y="5976739"/>
+            <a:ext cx="1917015" cy="720554"/>
+          </a:xfrm>
+          <a:prstGeom prst="rect">
+            <a:avLst/>
+          </a:prstGeom>
+        </p:spPr>
+      </p:pic>
+      <p:sp>
+        <p:nvSpPr>
+          <p:cNvPr id="51" name="文本框 50">
+            <a:extLst>
+              <a:ext uri="{FF2B5EF4-FFF2-40B4-BE49-F238E27FC236}">
+                <a16:creationId xmlns:a16="http://schemas.microsoft.com/office/drawing/2014/main" id="{3A8E5B49-E032-DCBF-E742-573E4873BBB9}"/>
+              </a:ext>
+            </a:extLst>
+          </p:cNvPr>
+          <p:cNvSpPr txBox="1"/>
+          <p:nvPr/>
+        </p:nvSpPr>
+        <p:spPr>
+          <a:xfrm>
+            <a:off x="6764357" y="6112518"/>
+            <a:ext cx="3726629" cy="584775"/>
+          </a:xfrm>
+          <a:prstGeom prst="rect">
+            <a:avLst/>
+          </a:prstGeom>
+          <a:noFill/>
+        </p:spPr>
+        <p:txBody>
+          <a:bodyPr wrap="square">
+            <a:spAutoFit/>
+          </a:bodyPr>
+          <a:lstStyle/>
+          <a:p>
+            <a:r>
+              <a:rPr kumimoji="1" lang="en-US" altLang="zh-CN" sz="1600" b="1" dirty="0">
+                <a:latin typeface="Arial" panose="020B0604020202020204" pitchFamily="34" charset="0"/>
+                <a:cs typeface="Arial" panose="020B0604020202020204" pitchFamily="34" charset="0"/>
+              </a:rPr>
+              <a:t>Author:</a:t>
+            </a:r>
+            <a:r>
+              <a:rPr kumimoji="1" lang="zh-CN" altLang="en-US" sz="1600" b="1" dirty="0">
+                <a:latin typeface="Arial" panose="020B0604020202020204" pitchFamily="34" charset="0"/>
+                <a:cs typeface="Arial" panose="020B0604020202020204" pitchFamily="34" charset="0"/>
+              </a:rPr>
+              <a:t> </a:t>
+            </a:r>
+            <a:r>
+              <a:rPr kumimoji="1" lang="en-US" altLang="zh-CN" sz="1600" dirty="0">
+                <a:latin typeface="Arial" panose="020B0604020202020204" pitchFamily="34" charset="0"/>
+                <a:cs typeface="Arial" panose="020B0604020202020204" pitchFamily="34" charset="0"/>
+              </a:rPr>
+              <a:t>Xingjian Tian, </a:t>
+            </a:r>
+            <a:r>
+              <a:rPr kumimoji="1" lang="en-US" altLang="zh-CN" sz="1600" dirty="0" err="1">
+                <a:latin typeface="Arial" panose="020B0604020202020204" pitchFamily="34" charset="0"/>
+                <a:cs typeface="Arial" panose="020B0604020202020204" pitchFamily="34" charset="0"/>
+              </a:rPr>
+              <a:t>Fangfei</a:t>
+            </a:r>
+            <a:r>
+              <a:rPr kumimoji="1" lang="en-US" altLang="zh-CN" sz="1600" dirty="0">
+                <a:latin typeface="Arial" panose="020B0604020202020204" pitchFamily="34" charset="0"/>
+                <a:cs typeface="Arial" panose="020B0604020202020204" pitchFamily="34" charset="0"/>
+              </a:rPr>
+              <a:t> Gou, </a:t>
+            </a:r>
+            <a:r>
+              <a:rPr kumimoji="1" lang="en-US" altLang="zh-CN" sz="1600" b="1" dirty="0">
+                <a:latin typeface="Arial" panose="020B0604020202020204" pitchFamily="34" charset="0"/>
+                <a:cs typeface="Arial" panose="020B0604020202020204" pitchFamily="34" charset="0"/>
+              </a:rPr>
+              <a:t> </a:t>
+            </a:r>
+            <a:r>
+              <a:rPr kumimoji="1" lang="en-US" altLang="zh-CN" sz="1600" dirty="0">
+                <a:latin typeface="Arial" panose="020B0604020202020204" pitchFamily="34" charset="0"/>
+                <a:cs typeface="Arial" panose="020B0604020202020204" pitchFamily="34" charset="0"/>
+              </a:rPr>
+              <a:t>Xin Tang, </a:t>
+            </a:r>
+            <a:r>
+              <a:rPr kumimoji="1" lang="en-US" altLang="zh-CN" sz="1600" dirty="0" err="1">
+                <a:latin typeface="Arial" panose="020B0604020202020204" pitchFamily="34" charset="0"/>
+                <a:cs typeface="Arial" panose="020B0604020202020204" pitchFamily="34" charset="0"/>
+              </a:rPr>
+              <a:t>Zeyu</a:t>
+            </a:r>
+            <a:r>
+              <a:rPr kumimoji="1" lang="en-US" altLang="zh-CN" sz="1600" dirty="0">
+                <a:latin typeface="Arial" panose="020B0604020202020204" pitchFamily="34" charset="0"/>
+                <a:cs typeface="Arial" panose="020B0604020202020204" pitchFamily="34" charset="0"/>
+              </a:rPr>
+              <a:t> Wang, </a:t>
+            </a:r>
+            <a:r>
+              <a:rPr kumimoji="1" lang="en-US" altLang="zh-CN" sz="1600" dirty="0" err="1">
+                <a:latin typeface="Arial" panose="020B0604020202020204" pitchFamily="34" charset="0"/>
+                <a:cs typeface="Arial" panose="020B0604020202020204" pitchFamily="34" charset="0"/>
+              </a:rPr>
+              <a:t>Yingke</a:t>
+            </a:r>
+            <a:r>
+              <a:rPr kumimoji="1" lang="en-US" altLang="zh-CN" sz="1600" dirty="0">
+                <a:latin typeface="Arial" panose="020B0604020202020204" pitchFamily="34" charset="0"/>
+                <a:cs typeface="Arial" panose="020B0604020202020204" pitchFamily="34" charset="0"/>
+              </a:rPr>
+              <a:t> Ding</a:t>
+            </a:r>
+            <a:endParaRPr kumimoji="1" lang="en-US" altLang="zh-CN" sz="1600" b="1" dirty="0">
+              <a:latin typeface="Arial" panose="020B0604020202020204" pitchFamily="34" charset="0"/>
+              <a:cs typeface="Arial" panose="020B0604020202020204" pitchFamily="34" charset="0"/>
+            </a:endParaRPr>
+          </a:p>
+        </p:txBody>
+      </p:sp>
     </p:spTree>
   </p:cSld>
   <p:clrMapOvr>
@@ -4085,6 +4110,8 @@
       </a:bgFillStyleLst>
     </a:fmtScheme>
   </a:themeElements>
+  <a:objectDefaults/>
+  <a:extraClrSchemeLst/>
   <a:extLst>
     <a:ext uri="{05A4C25C-085E-4340-85A3-A5531E510DB2}">
       <thm15:themeFamily xmlns:thm15="http://schemas.microsoft.com/office/thememl/2012/main" name="Office Theme" id="{62F939B6-93AF-4DB8-9C6B-D6C7DFDC589F}" vid="{4A3C46E8-61CC-4603-A589-7422A47A8E4A}"/>
@@ -4344,6 +4371,8 @@
       </a:bgFillStyleLst>
     </a:fmtScheme>
   </a:themeElements>
+  <a:objectDefaults/>
+  <a:extraClrSchemeLst/>
   <a:extLst>
     <a:ext uri="{05A4C25C-085E-4340-85A3-A5531E510DB2}">
       <thm15:themeFamily xmlns:thm15="http://schemas.microsoft.com/office/thememl/2012/main" name="Office Theme" id="{62F939B6-93AF-4DB8-9C6B-D6C7DFDC589F}" vid="{4A3C46E8-61CC-4603-A589-7422A47A8E4A}"/>

</xml_diff>